<commit_message>
uploaded material for lecture 2
</commit_message>
<xml_diff>
--- a/lectures/Lect02_SimpRegression.pptx
+++ b/lectures/Lect02_SimpRegression.pptx
@@ -13692,8 +13692,8 @@
           </a:p>
         </p:txBody>
       </p:sp>
-      <mc:AlternateContent xmlns:mc="http://schemas.openxmlformats.org/markup-compatibility/2006" xmlns:a14="http://schemas.microsoft.com/office/drawing/2010/main">
-        <mc:Choice Requires="a14">
+      <mc:AlternateContent xmlns:mc="http://schemas.openxmlformats.org/markup-compatibility/2006">
+        <mc:Choice xmlns:a14="http://schemas.microsoft.com/office/drawing/2010/main" Requires="a14">
           <p:sp>
             <p:nvSpPr>
               <p:cNvPr id="3" name="Content Placeholder 2"/>
@@ -13946,15 +13946,7 @@
               <a:p>
                 <a:r>
                   <a:rPr lang="en-US" dirty="0"/>
-                  <a:t>Cauchy-</a:t>
-                </a:r>
-                <a:r>
-                  <a:rPr lang="en-US" dirty="0" err="1"/>
-                  <a:t>Schartz</a:t>
-                </a:r>
-                <a:r>
-                  <a:rPr lang="en-US" dirty="0"/>
-                  <a:t> Law:  </a:t>
+                  <a:t>Cauchy-schwarz inequality :  </a:t>
                 </a:r>
                 <a14:m>
                   <m:oMath xmlns:m="http://schemas.openxmlformats.org/officeDocument/2006/math">
@@ -13993,7 +13985,7 @@
                       <a:rPr lang="en-US" b="0" i="1" smtClean="0">
                         <a:latin typeface="Cambria Math" panose="02040503050406030204" pitchFamily="18" charset="0"/>
                       </a:rPr>
-                      <m:t>|&lt;</m:t>
+                      <m:t>|≤</m:t>
                     </m:r>
                     <m:sSub>
                       <m:sSubPr>
@@ -14200,7 +14192,7 @@
             </p:txBody>
           </p:sp>
         </mc:Choice>
-        <mc:Fallback xmlns="">
+        <mc:Fallback>
           <p:sp>
             <p:nvSpPr>
               <p:cNvPr id="3" name="Content Placeholder 2"/>
@@ -14215,7 +14207,7 @@
               <a:blipFill>
                 <a:blip r:embed="rId2"/>
                 <a:stretch>
-                  <a:fillRect l="-1455" t="-1549"/>
+                  <a:fillRect l="-1387" t="-19591"/>
                 </a:stretch>
               </a:blipFill>
             </p:spPr>

</xml_diff>

<commit_message>
updated slides for lecture 2 and 3
</commit_message>
<xml_diff>
--- a/lectures/Lect02_SimpRegression.pptx
+++ b/lectures/Lect02_SimpRegression.pptx
@@ -244,7 +244,7 @@
           <a:p>
             <a:fld id="{B7D6DDD3-D7E9-488B-B626-1E8285E424D8}" type="datetimeFigureOut">
               <a:rPr lang="en-US" smtClean="0"/>
-              <a:t>2/3/21</a:t>
+              <a:t>2/18/21</a:t>
             </a:fld>
             <a:endParaRPr lang="en-US"/>
           </a:p>
@@ -8706,8 +8706,8 @@
           </a:p>
         </p:txBody>
       </p:sp>
-      <mc:AlternateContent xmlns:mc="http://schemas.openxmlformats.org/markup-compatibility/2006" xmlns:a14="http://schemas.microsoft.com/office/drawing/2010/main">
-        <mc:Choice Requires="a14">
+      <mc:AlternateContent xmlns:mc="http://schemas.openxmlformats.org/markup-compatibility/2006">
+        <mc:Choice xmlns:a14="http://schemas.microsoft.com/office/drawing/2010/main" Requires="a14">
           <p:sp>
             <p:nvSpPr>
               <p:cNvPr id="5" name="Content Placeholder 2">
@@ -9359,10 +9359,10 @@
                                 </m:sub>
                               </m:sSub>
                               <m:r>
-                                <a:rPr lang="en-US" i="1">
+                                <a:rPr lang="en-US" b="0" i="1" smtClean="0">
                                   <a:latin typeface="Cambria Math" panose="02040503050406030204" pitchFamily="18" charset="0"/>
                                 </a:rPr>
-                                <m:t>+</m:t>
+                                <m:t>−</m:t>
                               </m:r>
                               <m:sSub>
                                 <m:sSubPr>
@@ -9597,7 +9597,7 @@
             </p:txBody>
           </p:sp>
         </mc:Choice>
-        <mc:Fallback xmlns="">
+        <mc:Fallback>
           <p:sp>
             <p:nvSpPr>
               <p:cNvPr id="5" name="Content Placeholder 2">
@@ -9623,7 +9623,7 @@
               <a:blipFill>
                 <a:blip r:embed="rId2"/>
                 <a:stretch>
-                  <a:fillRect l="-3153" t="-1766"/>
+                  <a:fillRect l="-3150" t="-1667"/>
                 </a:stretch>
               </a:blipFill>
             </p:spPr>
@@ -13692,8 +13692,8 @@
           </a:p>
         </p:txBody>
       </p:sp>
-      <mc:AlternateContent xmlns:mc="http://schemas.openxmlformats.org/markup-compatibility/2006">
-        <mc:Choice xmlns:a14="http://schemas.microsoft.com/office/drawing/2010/main" Requires="a14">
+      <mc:AlternateContent xmlns:mc="http://schemas.openxmlformats.org/markup-compatibility/2006" xmlns:a14="http://schemas.microsoft.com/office/drawing/2010/main">
+        <mc:Choice Requires="a14">
           <p:sp>
             <p:nvSpPr>
               <p:cNvPr id="3" name="Content Placeholder 2"/>
@@ -14192,7 +14192,7 @@
             </p:txBody>
           </p:sp>
         </mc:Choice>
-        <mc:Fallback>
+        <mc:Fallback xmlns="">
           <p:sp>
             <p:nvSpPr>
               <p:cNvPr id="3" name="Content Placeholder 2"/>

</xml_diff>